<commit_message>
Update to input handling. Allows for more inputs
</commit_message>
<xml_diff>
--- a/OceanSimulation/Docs/Large Scale Ocean Rendering and Simulation Poster.pptx
+++ b/OceanSimulation/Docs/Large Scale Ocean Rendering and Simulation Poster.pptx
@@ -104,6 +104,11 @@
       </a:defRPr>
     </a:lvl9pPr>
   </p:defaultTextStyle>
+  <p:extLst>
+    <p:ext uri="{EFAFB233-063F-42B5-8137-9DF3F51BA10A}">
+      <p15:sldGuideLst xmlns:p15="http://schemas.microsoft.com/office/powerpoint/2012/main"/>
+    </p:ext>
+  </p:extLst>
 </p:presentation>
 </file>
 
@@ -238,7 +243,7 @@
           <a:p>
             <a:fld id="{E9044D0B-1B64-44E0-B288-46354825DC18}" type="datetimeFigureOut">
               <a:rPr lang="en-US" smtClean="0"/>
-              <a:t>4/27/2021</a:t>
+              <a:t>5/4/2021</a:t>
             </a:fld>
             <a:endParaRPr lang="en-US"/>
           </a:p>
@@ -408,7 +413,7 @@
           <a:p>
             <a:fld id="{E9044D0B-1B64-44E0-B288-46354825DC18}" type="datetimeFigureOut">
               <a:rPr lang="en-US" smtClean="0"/>
-              <a:t>4/27/2021</a:t>
+              <a:t>5/4/2021</a:t>
             </a:fld>
             <a:endParaRPr lang="en-US"/>
           </a:p>
@@ -588,7 +593,7 @@
           <a:p>
             <a:fld id="{E9044D0B-1B64-44E0-B288-46354825DC18}" type="datetimeFigureOut">
               <a:rPr lang="en-US" smtClean="0"/>
-              <a:t>4/27/2021</a:t>
+              <a:t>5/4/2021</a:t>
             </a:fld>
             <a:endParaRPr lang="en-US"/>
           </a:p>
@@ -758,7 +763,7 @@
           <a:p>
             <a:fld id="{E9044D0B-1B64-44E0-B288-46354825DC18}" type="datetimeFigureOut">
               <a:rPr lang="en-US" smtClean="0"/>
-              <a:t>4/27/2021</a:t>
+              <a:t>5/4/2021</a:t>
             </a:fld>
             <a:endParaRPr lang="en-US"/>
           </a:p>
@@ -1002,7 +1007,7 @@
           <a:p>
             <a:fld id="{E9044D0B-1B64-44E0-B288-46354825DC18}" type="datetimeFigureOut">
               <a:rPr lang="en-US" smtClean="0"/>
-              <a:t>4/27/2021</a:t>
+              <a:t>5/4/2021</a:t>
             </a:fld>
             <a:endParaRPr lang="en-US"/>
           </a:p>
@@ -1234,7 +1239,7 @@
           <a:p>
             <a:fld id="{E9044D0B-1B64-44E0-B288-46354825DC18}" type="datetimeFigureOut">
               <a:rPr lang="en-US" smtClean="0"/>
-              <a:t>4/27/2021</a:t>
+              <a:t>5/4/2021</a:t>
             </a:fld>
             <a:endParaRPr lang="en-US"/>
           </a:p>
@@ -1601,7 +1606,7 @@
           <a:p>
             <a:fld id="{E9044D0B-1B64-44E0-B288-46354825DC18}" type="datetimeFigureOut">
               <a:rPr lang="en-US" smtClean="0"/>
-              <a:t>4/27/2021</a:t>
+              <a:t>5/4/2021</a:t>
             </a:fld>
             <a:endParaRPr lang="en-US"/>
           </a:p>
@@ -1719,7 +1724,7 @@
           <a:p>
             <a:fld id="{E9044D0B-1B64-44E0-B288-46354825DC18}" type="datetimeFigureOut">
               <a:rPr lang="en-US" smtClean="0"/>
-              <a:t>4/27/2021</a:t>
+              <a:t>5/4/2021</a:t>
             </a:fld>
             <a:endParaRPr lang="en-US"/>
           </a:p>
@@ -1814,7 +1819,7 @@
           <a:p>
             <a:fld id="{E9044D0B-1B64-44E0-B288-46354825DC18}" type="datetimeFigureOut">
               <a:rPr lang="en-US" smtClean="0"/>
-              <a:t>4/27/2021</a:t>
+              <a:t>5/4/2021</a:t>
             </a:fld>
             <a:endParaRPr lang="en-US"/>
           </a:p>
@@ -2091,7 +2096,7 @@
           <a:p>
             <a:fld id="{E9044D0B-1B64-44E0-B288-46354825DC18}" type="datetimeFigureOut">
               <a:rPr lang="en-US" smtClean="0"/>
-              <a:t>4/27/2021</a:t>
+              <a:t>5/4/2021</a:t>
             </a:fld>
             <a:endParaRPr lang="en-US"/>
           </a:p>
@@ -2348,7 +2353,7 @@
           <a:p>
             <a:fld id="{E9044D0B-1B64-44E0-B288-46354825DC18}" type="datetimeFigureOut">
               <a:rPr lang="en-US" smtClean="0"/>
-              <a:t>4/27/2021</a:t>
+              <a:t>5/4/2021</a:t>
             </a:fld>
             <a:endParaRPr lang="en-US"/>
           </a:p>
@@ -2561,7 +2566,7 @@
           <a:p>
             <a:fld id="{E9044D0B-1B64-44E0-B288-46354825DC18}" type="datetimeFigureOut">
               <a:rPr lang="en-US" smtClean="0"/>
-              <a:t>4/27/2021</a:t>
+              <a:t>5/4/2021</a:t>
             </a:fld>
             <a:endParaRPr lang="en-US"/>
           </a:p>
@@ -2971,7 +2976,7 @@
           <p:cNvPr id="36" name="Rectangle 35">
             <a:extLst>
               <a:ext uri="{FF2B5EF4-FFF2-40B4-BE49-F238E27FC236}">
-                <a16:creationId xmlns:a16="http://schemas.microsoft.com/office/drawing/2014/main" id="{57097F8A-7019-4555-8BB6-CC28D043D156}"/>
+                <a16:creationId xmlns:a16="http://schemas.microsoft.com/office/drawing/2014/main" xmlns="" id="{57097F8A-7019-4555-8BB6-CC28D043D156}"/>
               </a:ext>
             </a:extLst>
           </p:cNvPr>
@@ -2980,8 +2985,8 @@
         </p:nvSpPr>
         <p:spPr>
           <a:xfrm>
-            <a:off x="0" y="0"/>
-            <a:ext cx="17106900" cy="6497384"/>
+            <a:off x="0" y="-46194"/>
+            <a:ext cx="18288000" cy="7323362"/>
           </a:xfrm>
           <a:prstGeom prst="rect">
             <a:avLst/>
@@ -3025,7 +3030,7 @@
           <p:cNvPr id="22" name="Rectangle: Diagonal Corners Snipped 21">
             <a:extLst>
               <a:ext uri="{FF2B5EF4-FFF2-40B4-BE49-F238E27FC236}">
-                <a16:creationId xmlns:a16="http://schemas.microsoft.com/office/drawing/2014/main" id="{0FC70254-D7A9-4D48-9B76-C81A02FBDEB0}"/>
+                <a16:creationId xmlns:a16="http://schemas.microsoft.com/office/drawing/2014/main" xmlns="" id="{0FC70254-D7A9-4D48-9B76-C81A02FBDEB0}"/>
               </a:ext>
             </a:extLst>
           </p:cNvPr>
@@ -3093,7 +3098,7 @@
           <p:cNvPr id="4" name="Rectangle 3">
             <a:extLst>
               <a:ext uri="{FF2B5EF4-FFF2-40B4-BE49-F238E27FC236}">
-                <a16:creationId xmlns:a16="http://schemas.microsoft.com/office/drawing/2014/main" id="{18D9FABE-231D-429F-B4CF-D3D26DAC9167}"/>
+                <a16:creationId xmlns:a16="http://schemas.microsoft.com/office/drawing/2014/main" xmlns="" id="{18D9FABE-231D-429F-B4CF-D3D26DAC9167}"/>
               </a:ext>
             </a:extLst>
           </p:cNvPr>
@@ -3102,8 +3107,8 @@
         </p:nvSpPr>
         <p:spPr>
           <a:xfrm>
-            <a:off x="-1" y="-1"/>
-            <a:ext cx="16195019" cy="5656871"/>
+            <a:off x="1009248" y="0"/>
+            <a:ext cx="16195019" cy="6192483"/>
           </a:xfrm>
           <a:prstGeom prst="rect">
             <a:avLst/>
@@ -3139,7 +3144,7 @@
           <p:cNvPr id="2" name="Title 1">
             <a:extLst>
               <a:ext uri="{FF2B5EF4-FFF2-40B4-BE49-F238E27FC236}">
-                <a16:creationId xmlns:a16="http://schemas.microsoft.com/office/drawing/2014/main" id="{D6D13F43-9079-46C8-ADD3-400C56FD4496}"/>
+                <a16:creationId xmlns:a16="http://schemas.microsoft.com/office/drawing/2014/main" xmlns="" id="{D6D13F43-9079-46C8-ADD3-400C56FD4496}"/>
               </a:ext>
             </a:extLst>
           </p:cNvPr>
@@ -3152,7 +3157,7 @@
         </p:nvSpPr>
         <p:spPr>
           <a:xfrm>
-            <a:off x="590670" y="755651"/>
+            <a:off x="2090707" y="961926"/>
             <a:ext cx="14497050" cy="3181350"/>
           </a:xfrm>
         </p:spPr>
@@ -3162,7 +3167,6 @@
           </a:bodyPr>
           <a:lstStyle/>
           <a:p>
-            <a:pPr algn="l"/>
             <a:r>
               <a:rPr lang="en-US" dirty="0"/>
               <a:t>Large Scale Ocean Rendering and Simulation</a:t>
@@ -3175,7 +3179,7 @@
           <p:cNvPr id="3" name="Subtitle 2">
             <a:extLst>
               <a:ext uri="{FF2B5EF4-FFF2-40B4-BE49-F238E27FC236}">
-                <a16:creationId xmlns:a16="http://schemas.microsoft.com/office/drawing/2014/main" id="{8E1B4BF2-0763-406A-B7C6-F039D036E92F}"/>
+                <a16:creationId xmlns:a16="http://schemas.microsoft.com/office/drawing/2014/main" xmlns="" id="{8E1B4BF2-0763-406A-B7C6-F039D036E92F}"/>
               </a:ext>
             </a:extLst>
           </p:cNvPr>
@@ -3188,7 +3192,7 @@
         </p:nvSpPr>
         <p:spPr>
           <a:xfrm>
-            <a:off x="590670" y="3783040"/>
+            <a:off x="1858232" y="4478794"/>
             <a:ext cx="14497050" cy="752424"/>
           </a:xfrm>
         </p:spPr>
@@ -3196,7 +3200,6 @@
           <a:bodyPr/>
           <a:lstStyle/>
           <a:p>
-            <a:pPr algn="r"/>
             <a:r>
               <a:rPr lang="en-US" dirty="0"/>
               <a:t>Spencer McKean</a:t>
@@ -3209,7 +3212,7 @@
           <p:cNvPr id="16" name="Picture 15" descr="A picture containing nature&#10;&#10;Description automatically generated">
             <a:extLst>
               <a:ext uri="{FF2B5EF4-FFF2-40B4-BE49-F238E27FC236}">
-                <a16:creationId xmlns:a16="http://schemas.microsoft.com/office/drawing/2014/main" id="{D992C0CC-52B0-4C98-8F33-A44FE166885C}"/>
+                <a16:creationId xmlns:a16="http://schemas.microsoft.com/office/drawing/2014/main" xmlns="" id="{D992C0CC-52B0-4C98-8F33-A44FE166885C}"/>
               </a:ext>
             </a:extLst>
           </p:cNvPr>
@@ -3245,7 +3248,7 @@
           <p:cNvPr id="18" name="Picture 17" descr="A picture containing outdoor, water, nature, wave&#10;&#10;Description automatically generated">
             <a:extLst>
               <a:ext uri="{FF2B5EF4-FFF2-40B4-BE49-F238E27FC236}">
-                <a16:creationId xmlns:a16="http://schemas.microsoft.com/office/drawing/2014/main" id="{480C1687-069E-476D-BF16-3BCFBAB8C143}"/>
+                <a16:creationId xmlns:a16="http://schemas.microsoft.com/office/drawing/2014/main" xmlns="" id="{480C1687-069E-476D-BF16-3BCFBAB8C143}"/>
               </a:ext>
             </a:extLst>
           </p:cNvPr>
@@ -3281,7 +3284,7 @@
           <p:cNvPr id="20" name="Picture 19" descr="A picture containing wave&#10;&#10;Description automatically generated">
             <a:extLst>
               <a:ext uri="{FF2B5EF4-FFF2-40B4-BE49-F238E27FC236}">
-                <a16:creationId xmlns:a16="http://schemas.microsoft.com/office/drawing/2014/main" id="{3AA1ED4B-A2DE-4A86-A1B7-4CD4D0804460}"/>
+                <a16:creationId xmlns:a16="http://schemas.microsoft.com/office/drawing/2014/main" xmlns="" id="{3AA1ED4B-A2DE-4A86-A1B7-4CD4D0804460}"/>
               </a:ext>
             </a:extLst>
           </p:cNvPr>
@@ -3317,7 +3320,7 @@
           <p:cNvPr id="28" name="Rectangle: Diagonal Corners Snipped 27">
             <a:extLst>
               <a:ext uri="{FF2B5EF4-FFF2-40B4-BE49-F238E27FC236}">
-                <a16:creationId xmlns:a16="http://schemas.microsoft.com/office/drawing/2014/main" id="{E3D4119E-CD6A-4F71-9AA4-F4254027E165}"/>
+                <a16:creationId xmlns:a16="http://schemas.microsoft.com/office/drawing/2014/main" xmlns="" id="{E3D4119E-CD6A-4F71-9AA4-F4254027E165}"/>
               </a:ext>
             </a:extLst>
           </p:cNvPr>
@@ -3385,7 +3388,7 @@
           <p:cNvPr id="29" name="Rectangle: Diagonal Corners Snipped 28">
             <a:extLst>
               <a:ext uri="{FF2B5EF4-FFF2-40B4-BE49-F238E27FC236}">
-                <a16:creationId xmlns:a16="http://schemas.microsoft.com/office/drawing/2014/main" id="{B825AF1E-4EFE-4D4F-A7C5-02B77CA33F5D}"/>
+                <a16:creationId xmlns:a16="http://schemas.microsoft.com/office/drawing/2014/main" xmlns="" id="{B825AF1E-4EFE-4D4F-A7C5-02B77CA33F5D}"/>
               </a:ext>
             </a:extLst>
           </p:cNvPr>
@@ -3453,7 +3456,7 @@
           <p:cNvPr id="30" name="TextBox 29">
             <a:extLst>
               <a:ext uri="{FF2B5EF4-FFF2-40B4-BE49-F238E27FC236}">
-                <a16:creationId xmlns:a16="http://schemas.microsoft.com/office/drawing/2014/main" id="{125A6B9F-31E6-49EB-A660-21A830E5ECA8}"/>
+                <a16:creationId xmlns:a16="http://schemas.microsoft.com/office/drawing/2014/main" xmlns="" id="{125A6B9F-31E6-49EB-A660-21A830E5ECA8}"/>
               </a:ext>
             </a:extLst>
           </p:cNvPr>
@@ -3514,14 +3517,14 @@
           </a:p>
         </p:txBody>
       </p:sp>
-      <mc:AlternateContent xmlns:mc="http://schemas.openxmlformats.org/markup-compatibility/2006">
-        <mc:Choice xmlns:a14="http://schemas.microsoft.com/office/drawing/2010/main" Requires="a14">
+      <mc:AlternateContent xmlns:mc="http://schemas.openxmlformats.org/markup-compatibility/2006" xmlns:a14="http://schemas.microsoft.com/office/drawing/2010/main">
+        <mc:Choice Requires="a14">
           <p:sp>
             <p:nvSpPr>
               <p:cNvPr id="31" name="TextBox 30">
                 <a:extLst>
                   <a:ext uri="{FF2B5EF4-FFF2-40B4-BE49-F238E27FC236}">
-                    <a16:creationId xmlns:a16="http://schemas.microsoft.com/office/drawing/2014/main" id="{139ACEEF-1939-4A4C-9CB3-5FC585118E9C}"/>
+                    <a16:creationId xmlns:a16="http://schemas.microsoft.com/office/drawing/2014/main" xmlns="" id="{139ACEEF-1939-4A4C-9CB3-5FC585118E9C}"/>
                   </a:ext>
                 </a:extLst>
               </p:cNvPr>
@@ -4647,7 +4650,7 @@
             </p:txBody>
           </p:sp>
         </mc:Choice>
-        <mc:Fallback>
+        <mc:Fallback xmlns="">
           <p:sp>
             <p:nvSpPr>
               <p:cNvPr id="31" name="TextBox 30">
@@ -4697,7 +4700,7 @@
           <p:cNvPr id="32" name="TextBox 31">
             <a:extLst>
               <a:ext uri="{FF2B5EF4-FFF2-40B4-BE49-F238E27FC236}">
-                <a16:creationId xmlns:a16="http://schemas.microsoft.com/office/drawing/2014/main" id="{2A6046A5-8654-4359-873F-97401800DC6D}"/>
+                <a16:creationId xmlns:a16="http://schemas.microsoft.com/office/drawing/2014/main" xmlns="" id="{2A6046A5-8654-4359-873F-97401800DC6D}"/>
               </a:ext>
             </a:extLst>
           </p:cNvPr>
@@ -4762,7 +4765,7 @@
           <p:cNvPr id="33" name="TextBox 32">
             <a:extLst>
               <a:ext uri="{FF2B5EF4-FFF2-40B4-BE49-F238E27FC236}">
-                <a16:creationId xmlns:a16="http://schemas.microsoft.com/office/drawing/2014/main" id="{9F218771-363B-45C7-8727-E35C0B2AF901}"/>
+                <a16:creationId xmlns:a16="http://schemas.microsoft.com/office/drawing/2014/main" xmlns="" id="{9F218771-363B-45C7-8727-E35C0B2AF901}"/>
               </a:ext>
             </a:extLst>
           </p:cNvPr>
@@ -4812,7 +4815,7 @@
           <p:cNvPr id="35" name="Picture 34">
             <a:extLst>
               <a:ext uri="{FF2B5EF4-FFF2-40B4-BE49-F238E27FC236}">
-                <a16:creationId xmlns:a16="http://schemas.microsoft.com/office/drawing/2014/main" id="{1C437BC4-BFDD-4AE6-9444-056AE85A7A1F}"/>
+                <a16:creationId xmlns:a16="http://schemas.microsoft.com/office/drawing/2014/main" xmlns="" id="{1C437BC4-BFDD-4AE6-9444-056AE85A7A1F}"/>
               </a:ext>
             </a:extLst>
           </p:cNvPr>
@@ -4834,8 +4837,8 @@
         </p:blipFill>
         <p:spPr>
           <a:xfrm>
-            <a:off x="419100" y="17272075"/>
-            <a:ext cx="6829366" cy="3784607"/>
+            <a:off x="292100" y="17012239"/>
+            <a:ext cx="7289800" cy="4039764"/>
           </a:xfrm>
           <a:prstGeom prst="rect">
             <a:avLst/>
@@ -4863,7 +4866,7 @@
           <p:cNvPr id="38" name="Picture 37" descr="Shape, icon&#10;&#10;Description automatically generated">
             <a:extLst>
               <a:ext uri="{FF2B5EF4-FFF2-40B4-BE49-F238E27FC236}">
-                <a16:creationId xmlns:a16="http://schemas.microsoft.com/office/drawing/2014/main" id="{FB27FA80-5021-4165-9E24-18461CFB477A}"/>
+                <a16:creationId xmlns:a16="http://schemas.microsoft.com/office/drawing/2014/main" xmlns="" id="{FB27FA80-5021-4165-9E24-18461CFB477A}"/>
               </a:ext>
             </a:extLst>
           </p:cNvPr>
@@ -4886,8 +4889,8 @@
         </p:blipFill>
         <p:spPr>
           <a:xfrm>
-            <a:off x="10134660" y="23056857"/>
-            <a:ext cx="6362700" cy="2857500"/>
+            <a:off x="7277100" y="23361998"/>
+            <a:ext cx="5003800" cy="2247215"/>
           </a:xfrm>
           <a:prstGeom prst="rect">
             <a:avLst/>
@@ -4899,7 +4902,7 @@
           <p:cNvPr id="41" name="Picture 40">
             <a:extLst>
               <a:ext uri="{FF2B5EF4-FFF2-40B4-BE49-F238E27FC236}">
-                <a16:creationId xmlns:a16="http://schemas.microsoft.com/office/drawing/2014/main" id="{CDCE8EC2-EDD1-4FDC-9D31-0F3FDDC77231}"/>
+                <a16:creationId xmlns:a16="http://schemas.microsoft.com/office/drawing/2014/main" xmlns="" id="{CDCE8EC2-EDD1-4FDC-9D31-0F3FDDC77231}"/>
               </a:ext>
             </a:extLst>
           </p:cNvPr>
@@ -4921,8 +4924,59 @@
         </p:blipFill>
         <p:spPr>
           <a:xfrm>
-            <a:off x="10134660" y="11855012"/>
-            <a:ext cx="7162680" cy="4005119"/>
+            <a:off x="9339232" y="11252053"/>
+            <a:ext cx="8240731" cy="4607927"/>
+          </a:xfrm>
+          <a:prstGeom prst="rect">
+            <a:avLst/>
+          </a:prstGeom>
+          <a:ln w="38100" cap="sq">
+            <a:solidFill>
+              <a:schemeClr val="accent1">
+                <a:lumMod val="50000"/>
+              </a:schemeClr>
+            </a:solidFill>
+            <a:prstDash val="solid"/>
+            <a:miter lim="800000"/>
+          </a:ln>
+          <a:effectLst>
+            <a:outerShdw blurRad="50800" dist="38100" dir="2700000" algn="tl" rotWithShape="0">
+              <a:srgbClr val="000000">
+                <a:alpha val="43000"/>
+              </a:srgbClr>
+            </a:outerShdw>
+          </a:effectLst>
+        </p:spPr>
+      </p:pic>
+      <p:pic>
+        <p:nvPicPr>
+          <p:cNvPr id="21" name="Picture 20">
+            <a:extLst>
+              <a:ext uri="{FF2B5EF4-FFF2-40B4-BE49-F238E27FC236}">
+                <a16:creationId xmlns:a16="http://schemas.microsoft.com/office/drawing/2014/main" xmlns="" id="{1C437BC4-BFDD-4AE6-9444-056AE85A7A1F}"/>
+              </a:ext>
+            </a:extLst>
+          </p:cNvPr>
+          <p:cNvPicPr>
+            <a:picLocks noChangeAspect="1"/>
+          </p:cNvPicPr>
+          <p:nvPr/>
+        </p:nvPicPr>
+        <p:blipFill rotWithShape="1">
+          <a:blip r:embed="rId9">
+            <a:extLst>
+              <a:ext uri="{28A0092B-C50C-407E-A947-70E740481C1C}">
+                <a14:useLocalDpi xmlns:a14="http://schemas.microsoft.com/office/drawing/2010/main" val="0"/>
+              </a:ext>
+            </a:extLst>
+          </a:blip>
+          <a:srcRect l="21353" r="6897"/>
+          <a:stretch/>
+        </p:blipFill>
+        <p:spPr>
+          <a:xfrm>
+            <a:off x="12700000" y="22465724"/>
+            <a:ext cx="5168900" cy="4039764"/>
           </a:xfrm>
           <a:prstGeom prst="rect">
             <a:avLst/>

</xml_diff>